<commit_message>
Updating the Demo introduction lecture for Machine Learning Using Python
</commit_message>
<xml_diff>
--- a/Demo/ML Introduction using Python.pptx
+++ b/Demo/ML Introduction using Python.pptx
@@ -5,7 +5,7 @@
     <p:sldMasterId id="2147483720" r:id="rId1"/>
   </p:sldMasterIdLst>
   <p:notesMasterIdLst>
-    <p:notesMasterId r:id="rId14"/>
+    <p:notesMasterId r:id="rId16"/>
   </p:notesMasterIdLst>
   <p:sldIdLst>
     <p:sldId id="286" r:id="rId2"/>
@@ -16,10 +16,12 @@
     <p:sldId id="305" r:id="rId7"/>
     <p:sldId id="306" r:id="rId8"/>
     <p:sldId id="307" r:id="rId9"/>
-    <p:sldId id="308" r:id="rId10"/>
-    <p:sldId id="309" r:id="rId11"/>
-    <p:sldId id="311" r:id="rId12"/>
-    <p:sldId id="310" r:id="rId13"/>
+    <p:sldId id="312" r:id="rId10"/>
+    <p:sldId id="308" r:id="rId11"/>
+    <p:sldId id="313" r:id="rId12"/>
+    <p:sldId id="309" r:id="rId13"/>
+    <p:sldId id="311" r:id="rId14"/>
+    <p:sldId id="310" r:id="rId15"/>
   </p:sldIdLst>
   <p:sldSz cx="12192000" cy="6858000"/>
   <p:notesSz cx="12192000" cy="6858000"/>
@@ -6573,20 +6575,12 @@
               <a:rPr lang="en-US" dirty="0" smtClean="0"/>
               <a:t> </a:t>
             </a:r>
-            <a:r>
-              <a:rPr lang="en-US" dirty="0" smtClean="0"/>
-              <a:t/>
-            </a:r>
             <a:br>
               <a:rPr lang="en-US" dirty="0" smtClean="0"/>
             </a:br>
             <a:r>
               <a:rPr lang="en-US" dirty="0" smtClean="0"/>
-              <a:t>Machine </a:t>
-            </a:r>
-            <a:r>
-              <a:rPr lang="en-US" dirty="0" smtClean="0"/>
-              <a:t>Learning</a:t>
+              <a:t>Machine Learning</a:t>
             </a:r>
             <a:br>
               <a:rPr lang="en-US" dirty="0" smtClean="0"/>
@@ -6608,11 +6602,7 @@
             </a:br>
             <a:r>
               <a:rPr lang="en-US" sz="3100" dirty="0" smtClean="0"/>
-              <a:t>an Introduction</a:t>
-            </a:r>
-            <a:r>
-              <a:rPr lang="en-US" sz="3100" dirty="0" smtClean="0"/>
-              <a:t> </a:t>
+              <a:t>an Introduction </a:t>
             </a:r>
             <a:endParaRPr lang="en-IN" sz="3100" dirty="0"/>
           </a:p>
@@ -6695,8 +6685,8 @@
         </p:nvSpPr>
         <p:spPr>
           <a:xfrm>
-            <a:off x="1295400" y="1"/>
-            <a:ext cx="10018713" cy="990600"/>
+            <a:off x="1480299" y="1"/>
+            <a:ext cx="10018713" cy="1143000"/>
           </a:xfrm>
         </p:spPr>
         <p:txBody>
@@ -6704,364 +6694,159 @@
           <a:lstStyle/>
           <a:p>
             <a:r>
-              <a:rPr lang="en-US" dirty="0" err="1" smtClean="0"/>
-              <a:t>RandomForest</a:t>
-            </a:r>
-            <a:r>
               <a:rPr lang="en-US" dirty="0" smtClean="0"/>
-              <a:t> (Recap)</a:t>
+              <a:t>Steps in Machine Learning</a:t>
             </a:r>
             <a:endParaRPr lang="en-IN" dirty="0"/>
           </a:p>
         </p:txBody>
       </p:sp>
-      <p:pic>
-        <p:nvPicPr>
-          <p:cNvPr id="4" name="Content Placeholder 4"/>
-          <p:cNvPicPr>
-            <a:picLocks noGrp="1" noChangeAspect="1"/>
-          </p:cNvPicPr>
+      <p:sp>
+        <p:nvSpPr>
+          <p:cNvPr id="3" name="Content Placeholder 2"/>
+          <p:cNvSpPr>
+            <a:spLocks noGrp="1"/>
+          </p:cNvSpPr>
           <p:nvPr>
             <p:ph idx="1"/>
           </p:nvPr>
-        </p:nvPicPr>
-        <p:blipFill>
-          <a:blip r:embed="rId2"/>
-          <a:stretch>
-            <a:fillRect/>
-          </a:stretch>
-        </p:blipFill>
-        <p:spPr>
-          <a:xfrm>
-            <a:off x="7620001" y="3472054"/>
-            <a:ext cx="4555958" cy="3309746"/>
-          </a:xfrm>
-          <a:prstGeom prst="rect">
-            <a:avLst/>
-          </a:prstGeom>
-        </p:spPr>
-      </p:pic>
-      <p:sp>
-        <p:nvSpPr>
-          <p:cNvPr id="5" name="Content Placeholder 2"/>
-          <p:cNvSpPr txBox="1">
-            <a:spLocks/>
-          </p:cNvSpPr>
-          <p:nvPr/>
         </p:nvSpPr>
         <p:spPr>
           <a:xfrm>
             <a:off x="2133600" y="1447800"/>
             <a:ext cx="9906000" cy="5717090"/>
           </a:xfrm>
-          <a:prstGeom prst="rect">
-            <a:avLst/>
-          </a:prstGeom>
         </p:spPr>
         <p:txBody>
-          <a:bodyPr vert="horz" lIns="91440" tIns="45720" rIns="91440" bIns="45720" rtlCol="0" anchor="ctr">
-            <a:normAutofit/>
-          </a:bodyPr>
-          <a:lstStyle>
-            <a:lvl1pPr marL="285750" indent="-285750" algn="l" defTabSz="457200" rtl="0" eaLnBrk="1" latinLnBrk="0" hangingPunct="1">
-              <a:spcBef>
-                <a:spcPct val="20000"/>
-              </a:spcBef>
-              <a:spcAft>
-                <a:spcPts val="600"/>
-              </a:spcAft>
-              <a:buClr>
-                <a:schemeClr val="accent1">
-                  <a:lumMod val="75000"/>
-                </a:schemeClr>
-              </a:buClr>
-              <a:buSzPct val="145000"/>
-              <a:buFont typeface="Arial"/>
-              <a:buChar char="•"/>
-              <a:defRPr sz="2400" kern="1200" cap="none">
-                <a:solidFill>
-                  <a:schemeClr val="tx1"/>
-                </a:solidFill>
-                <a:effectLst/>
-                <a:latin typeface="+mn-lt"/>
-                <a:ea typeface="+mn-ea"/>
-                <a:cs typeface="+mn-cs"/>
-              </a:defRPr>
-            </a:lvl1pPr>
-            <a:lvl2pPr marL="742950" indent="-285750" algn="l" defTabSz="457200" rtl="0" eaLnBrk="1" latinLnBrk="0" hangingPunct="1">
-              <a:spcBef>
-                <a:spcPct val="20000"/>
-              </a:spcBef>
-              <a:spcAft>
-                <a:spcPts val="600"/>
-              </a:spcAft>
-              <a:buClr>
-                <a:schemeClr val="accent1">
-                  <a:lumMod val="75000"/>
-                </a:schemeClr>
-              </a:buClr>
-              <a:buSzPct val="145000"/>
-              <a:buFont typeface="Arial"/>
-              <a:buChar char="•"/>
-              <a:defRPr sz="2000" kern="1200" cap="none">
-                <a:solidFill>
-                  <a:schemeClr val="tx1"/>
-                </a:solidFill>
-                <a:effectLst/>
-                <a:latin typeface="+mn-lt"/>
-                <a:ea typeface="+mn-ea"/>
-                <a:cs typeface="+mn-cs"/>
-              </a:defRPr>
-            </a:lvl2pPr>
-            <a:lvl3pPr marL="1200150" indent="-285750" algn="l" defTabSz="457200" rtl="0" eaLnBrk="1" latinLnBrk="0" hangingPunct="1">
-              <a:spcBef>
-                <a:spcPct val="20000"/>
-              </a:spcBef>
-              <a:spcAft>
-                <a:spcPts val="600"/>
-              </a:spcAft>
-              <a:buClr>
-                <a:schemeClr val="accent1">
-                  <a:lumMod val="75000"/>
-                </a:schemeClr>
-              </a:buClr>
-              <a:buSzPct val="145000"/>
-              <a:buFont typeface="Arial"/>
-              <a:buChar char="•"/>
-              <a:defRPr sz="1800" kern="1200" cap="none">
-                <a:solidFill>
-                  <a:schemeClr val="tx1"/>
-                </a:solidFill>
-                <a:effectLst/>
-                <a:latin typeface="+mn-lt"/>
-                <a:ea typeface="+mn-ea"/>
-                <a:cs typeface="+mn-cs"/>
-              </a:defRPr>
-            </a:lvl3pPr>
-            <a:lvl4pPr marL="1543050" indent="-171450" algn="l" defTabSz="457200" rtl="0" eaLnBrk="1" latinLnBrk="0" hangingPunct="1">
-              <a:spcBef>
-                <a:spcPct val="20000"/>
-              </a:spcBef>
-              <a:spcAft>
-                <a:spcPts val="600"/>
-              </a:spcAft>
-              <a:buClr>
-                <a:schemeClr val="accent1">
-                  <a:lumMod val="75000"/>
-                </a:schemeClr>
-              </a:buClr>
-              <a:buSzPct val="145000"/>
-              <a:buFont typeface="Arial"/>
-              <a:buChar char="•"/>
-              <a:defRPr sz="1600" kern="1200" cap="none">
-                <a:solidFill>
-                  <a:schemeClr val="tx1"/>
-                </a:solidFill>
-                <a:effectLst/>
-                <a:latin typeface="+mn-lt"/>
-                <a:ea typeface="+mn-ea"/>
-                <a:cs typeface="+mn-cs"/>
-              </a:defRPr>
-            </a:lvl4pPr>
-            <a:lvl5pPr marL="2000250" indent="-171450" algn="l" defTabSz="457200" rtl="0" eaLnBrk="1" latinLnBrk="0" hangingPunct="1">
-              <a:spcBef>
-                <a:spcPct val="20000"/>
-              </a:spcBef>
-              <a:spcAft>
-                <a:spcPts val="600"/>
-              </a:spcAft>
-              <a:buClr>
-                <a:schemeClr val="accent1">
-                  <a:lumMod val="75000"/>
-                </a:schemeClr>
-              </a:buClr>
-              <a:buSzPct val="145000"/>
-              <a:buFont typeface="Arial"/>
-              <a:buChar char="•"/>
-              <a:defRPr sz="1400" kern="1200" cap="none">
-                <a:solidFill>
-                  <a:schemeClr val="tx1"/>
-                </a:solidFill>
-                <a:effectLst/>
-                <a:latin typeface="+mn-lt"/>
-                <a:ea typeface="+mn-ea"/>
-                <a:cs typeface="+mn-cs"/>
-              </a:defRPr>
-            </a:lvl5pPr>
-            <a:lvl6pPr marL="2514600" indent="-228600" algn="l" defTabSz="457200" rtl="0" eaLnBrk="1" latinLnBrk="0" hangingPunct="1">
-              <a:spcBef>
-                <a:spcPct val="20000"/>
-              </a:spcBef>
-              <a:spcAft>
-                <a:spcPts val="600"/>
-              </a:spcAft>
-              <a:buClr>
-                <a:schemeClr val="accent1">
-                  <a:lumMod val="75000"/>
-                </a:schemeClr>
-              </a:buClr>
-              <a:buSzPct val="145000"/>
-              <a:buFont typeface="Arial"/>
-              <a:buChar char="•"/>
-              <a:defRPr sz="1400" kern="1200" cap="none">
-                <a:solidFill>
-                  <a:schemeClr val="tx1"/>
-                </a:solidFill>
-                <a:effectLst/>
-                <a:latin typeface="+mn-lt"/>
-                <a:ea typeface="+mn-ea"/>
-                <a:cs typeface="+mn-cs"/>
-              </a:defRPr>
-            </a:lvl6pPr>
-            <a:lvl7pPr marL="2971800" indent="-228600" algn="l" defTabSz="457200" rtl="0" eaLnBrk="1" latinLnBrk="0" hangingPunct="1">
-              <a:spcBef>
-                <a:spcPct val="20000"/>
-              </a:spcBef>
-              <a:spcAft>
-                <a:spcPts val="600"/>
-              </a:spcAft>
-              <a:buClr>
-                <a:schemeClr val="accent1">
-                  <a:lumMod val="75000"/>
-                </a:schemeClr>
-              </a:buClr>
-              <a:buSzPct val="145000"/>
-              <a:buFont typeface="Arial"/>
-              <a:buChar char="•"/>
-              <a:defRPr sz="1400" kern="1200" cap="none">
-                <a:solidFill>
-                  <a:schemeClr val="tx1"/>
-                </a:solidFill>
-                <a:effectLst/>
-                <a:latin typeface="+mn-lt"/>
-                <a:ea typeface="+mn-ea"/>
-                <a:cs typeface="+mn-cs"/>
-              </a:defRPr>
-            </a:lvl7pPr>
-            <a:lvl8pPr marL="3429000" indent="-228600" algn="l" defTabSz="457200" rtl="0" eaLnBrk="1" latinLnBrk="0" hangingPunct="1">
-              <a:spcBef>
-                <a:spcPct val="20000"/>
-              </a:spcBef>
-              <a:spcAft>
-                <a:spcPts val="600"/>
-              </a:spcAft>
-              <a:buClr>
-                <a:schemeClr val="accent1">
-                  <a:lumMod val="75000"/>
-                </a:schemeClr>
-              </a:buClr>
-              <a:buSzPct val="145000"/>
-              <a:buFont typeface="Arial"/>
-              <a:buChar char="•"/>
-              <a:defRPr sz="1400" kern="1200" cap="none">
-                <a:solidFill>
-                  <a:schemeClr val="tx1"/>
-                </a:solidFill>
-                <a:effectLst/>
-                <a:latin typeface="+mn-lt"/>
-                <a:ea typeface="+mn-ea"/>
-                <a:cs typeface="+mn-cs"/>
-              </a:defRPr>
-            </a:lvl8pPr>
-            <a:lvl9pPr marL="3886200" indent="-228600" algn="l" defTabSz="457200" rtl="0" eaLnBrk="1" latinLnBrk="0" hangingPunct="1">
-              <a:spcBef>
-                <a:spcPct val="20000"/>
-              </a:spcBef>
-              <a:spcAft>
-                <a:spcPts val="600"/>
-              </a:spcAft>
-              <a:buClr>
-                <a:schemeClr val="accent1">
-                  <a:lumMod val="75000"/>
-                </a:schemeClr>
-              </a:buClr>
-              <a:buSzPct val="145000"/>
-              <a:buFont typeface="Arial"/>
-              <a:buChar char="•"/>
-              <a:defRPr sz="1400" kern="1200" cap="none">
-                <a:solidFill>
-                  <a:schemeClr val="tx1"/>
-                </a:solidFill>
-                <a:effectLst/>
-                <a:latin typeface="+mn-lt"/>
-                <a:ea typeface="+mn-ea"/>
-                <a:cs typeface="+mn-cs"/>
-              </a:defRPr>
-            </a:lvl9pPr>
-          </a:lstStyle>
-          <a:p>
-            <a:pPr lvl="1"/>
-            <a:endParaRPr lang="en-IN" dirty="0"/>
-          </a:p>
-        </p:txBody>
-      </p:sp>
-      <p:sp>
-        <p:nvSpPr>
-          <p:cNvPr id="6" name="Rectangle 5"/>
-          <p:cNvSpPr/>
-          <p:nvPr/>
-        </p:nvSpPr>
-        <p:spPr>
-          <a:xfrm>
-            <a:off x="1828800" y="990601"/>
-            <a:ext cx="10210800" cy="2031325"/>
-          </a:xfrm>
-          <a:prstGeom prst="rect">
-            <a:avLst/>
-          </a:prstGeom>
-        </p:spPr>
-        <p:txBody>
-          <a:bodyPr wrap="square">
-            <a:spAutoFit/>
+          <a:bodyPr>
+            <a:normAutofit fontScale="85000" lnSpcReduction="20000"/>
           </a:bodyPr>
           <a:lstStyle/>
           <a:p>
             <a:r>
+              <a:rPr lang="en-IN" dirty="0"/>
+              <a:t>Gathering data </a:t>
+            </a:r>
+            <a:r>
+              <a:rPr lang="en-IN" dirty="0" smtClean="0"/>
+              <a:t>: Related , Connected , Accurate , Enough</a:t>
+            </a:r>
+            <a:endParaRPr lang="en-US" dirty="0" smtClean="0"/>
+          </a:p>
+          <a:p>
+            <a:r>
+              <a:rPr lang="en-US" dirty="0" smtClean="0"/>
+              <a:t>EDA : Exploratory Data Analysis</a:t>
+            </a:r>
+          </a:p>
+          <a:p>
+            <a:pPr lvl="1"/>
+            <a:r>
+              <a:rPr lang="en-US" dirty="0" smtClean="0"/>
+              <a:t>Explore Features as Continues , Categorical , Ordinal &amp; their distributions</a:t>
+            </a:r>
+          </a:p>
+          <a:p>
+            <a:pPr lvl="1"/>
+            <a:r>
+              <a:rPr lang="en-US" dirty="0" smtClean="0"/>
+              <a:t>Visualizing their relation with each other ; with the dependent variable</a:t>
+            </a:r>
+          </a:p>
+          <a:p>
+            <a:r>
+              <a:rPr lang="en-US" dirty="0" smtClean="0"/>
+              <a:t>Pre Processing the Data</a:t>
+            </a:r>
+          </a:p>
+          <a:p>
+            <a:pPr lvl="1"/>
+            <a:r>
+              <a:rPr lang="en-US" dirty="0" smtClean="0"/>
+              <a:t>Feature Generation</a:t>
+            </a:r>
+          </a:p>
+          <a:p>
+            <a:pPr lvl="1"/>
+            <a:r>
+              <a:rPr lang="en-US" dirty="0" smtClean="0"/>
+              <a:t>Feature Elimination</a:t>
+            </a:r>
+          </a:p>
+          <a:p>
+            <a:pPr lvl="1"/>
+            <a:r>
+              <a:rPr lang="en-US" dirty="0" smtClean="0"/>
+              <a:t>Feature Transformation</a:t>
+            </a:r>
+          </a:p>
+          <a:p>
+            <a:pPr lvl="2"/>
+            <a:r>
+              <a:rPr lang="en-US" dirty="0" smtClean="0"/>
+              <a:t>Continues Variables :  Center , Scale , Box Cox</a:t>
+            </a:r>
+          </a:p>
+          <a:p>
+            <a:pPr lvl="2"/>
+            <a:r>
+              <a:rPr lang="en-US" dirty="0" smtClean="0"/>
+              <a:t>Categorical Variable :  Label Encoding ; One Hot Encoding </a:t>
+            </a:r>
+          </a:p>
+          <a:p>
+            <a:r>
+              <a:rPr lang="en-IN" dirty="0"/>
+              <a:t>Choosing the right algorithm / </a:t>
+            </a:r>
+            <a:r>
+              <a:rPr lang="en-IN" dirty="0" smtClean="0"/>
+              <a:t>model</a:t>
+            </a:r>
+            <a:endParaRPr lang="en-US" b="1" dirty="0">
+              <a:solidFill>
+                <a:srgbClr val="00B0F0"/>
+              </a:solidFill>
+            </a:endParaRPr>
+          </a:p>
+          <a:p>
+            <a:r>
               <a:rPr lang="en-US" dirty="0"/>
-              <a:t>Random forests include three main tuning parameters.</a:t>
-            </a:r>
-          </a:p>
-          <a:p>
-            <a:pPr marL="742950" lvl="1" indent="-285750">
-              <a:buFont typeface="Arial" panose="020B0604020202020204" pitchFamily="34" charset="0"/>
-              <a:buChar char="•"/>
-            </a:pPr>
-            <a:r>
-              <a:rPr lang="en-US" b="1" dirty="0"/>
-              <a:t>Node Size:</a:t>
-            </a:r>
-            <a:r>
-              <a:rPr lang="en-US" dirty="0"/>
-              <a:t> unlike in decision trees, the number of observations in the terminal nodes of each tree of the forest can be very small. The goal is to grow trees with as little bias as possible.</a:t>
-            </a:r>
-          </a:p>
-          <a:p>
-            <a:pPr marL="742950" lvl="1" indent="-285750">
-              <a:buFont typeface="Arial" panose="020B0604020202020204" pitchFamily="34" charset="0"/>
-              <a:buChar char="•"/>
-            </a:pPr>
-            <a:r>
-              <a:rPr lang="en-US" b="1" dirty="0"/>
-              <a:t>Number of Trees:</a:t>
-            </a:r>
-            <a:r>
-              <a:rPr lang="en-US" dirty="0"/>
-              <a:t> in practice, 500 trees is often a good choice.</a:t>
-            </a:r>
-          </a:p>
-          <a:p>
-            <a:pPr marL="742950" lvl="1" indent="-285750">
-              <a:buFont typeface="Arial" panose="020B0604020202020204" pitchFamily="34" charset="0"/>
-              <a:buChar char="•"/>
-            </a:pPr>
-            <a:r>
-              <a:rPr lang="en-US" b="1" dirty="0"/>
-              <a:t>Number of Predictors Sampled: </a:t>
-            </a:r>
-            <a:r>
-              <a:rPr lang="en-US" dirty="0"/>
-              <a:t>the number of predictors sampled at each split would seem to be a key tuning parameter that should affect how well random forests perform. Sampling 2-5 each time is often adequate.</a:t>
-            </a:r>
+              <a:t>Over fitting vs. Under fitting : Test / Train </a:t>
+            </a:r>
+            <a:r>
+              <a:rPr lang="en-US" dirty="0" smtClean="0"/>
+              <a:t>Split Strategies</a:t>
+            </a:r>
+            <a:endParaRPr lang="en-US" b="1" dirty="0">
+              <a:solidFill>
+                <a:srgbClr val="00B0F0"/>
+              </a:solidFill>
+            </a:endParaRPr>
+          </a:p>
+          <a:p>
+            <a:r>
+              <a:rPr lang="en-IN" dirty="0"/>
+              <a:t>Evaluation</a:t>
+            </a:r>
+          </a:p>
+          <a:p>
+            <a:r>
+              <a:rPr lang="en-IN" dirty="0"/>
+              <a:t>Hyper parameter tuning</a:t>
+            </a:r>
+          </a:p>
+          <a:p>
+            <a:r>
+              <a:rPr lang="en-IN" dirty="0"/>
+              <a:t>Prediction</a:t>
+            </a:r>
+          </a:p>
+          <a:p>
+            <a:endParaRPr lang="en-US" dirty="0" smtClean="0"/>
+          </a:p>
+          <a:p>
+            <a:pPr lvl="1"/>
             <a:endParaRPr lang="en-IN" dirty="0"/>
           </a:p>
         </p:txBody>
@@ -7069,7 +6854,7 @@
     </p:spTree>
     <p:extLst>
       <p:ext uri="{BB962C8B-B14F-4D97-AF65-F5344CB8AC3E}">
-        <p14:creationId xmlns:p14="http://schemas.microsoft.com/office/powerpoint/2010/main" val="751711149"/>
+        <p14:creationId xmlns:p14="http://schemas.microsoft.com/office/powerpoint/2010/main" val="3281074935"/>
       </p:ext>
     </p:extLst>
   </p:cSld>
@@ -7106,6 +6891,504 @@
             <p:ph type="title"/>
           </p:nvPr>
         </p:nvSpPr>
+        <p:spPr/>
+        <p:txBody>
+          <a:bodyPr/>
+          <a:lstStyle/>
+          <a:p>
+            <a:r>
+              <a:rPr lang="en-US" dirty="0" smtClean="0"/>
+              <a:t>A </a:t>
+            </a:r>
+            <a:r>
+              <a:rPr lang="en-US" dirty="0" err="1" smtClean="0"/>
+              <a:t>Scikit</a:t>
+            </a:r>
+            <a:r>
+              <a:rPr lang="en-US" dirty="0" smtClean="0"/>
+              <a:t> Learn applied example</a:t>
+            </a:r>
+            <a:endParaRPr lang="en-IN" dirty="0"/>
+          </a:p>
+        </p:txBody>
+      </p:sp>
+      <p:sp>
+        <p:nvSpPr>
+          <p:cNvPr id="3" name="Content Placeholder 2"/>
+          <p:cNvSpPr>
+            <a:spLocks noGrp="1"/>
+          </p:cNvSpPr>
+          <p:nvPr>
+            <p:ph idx="1"/>
+          </p:nvPr>
+        </p:nvSpPr>
+        <p:spPr/>
+        <p:txBody>
+          <a:bodyPr/>
+          <a:lstStyle/>
+          <a:p>
+            <a:endParaRPr lang="en-IN" dirty="0"/>
+          </a:p>
+        </p:txBody>
+      </p:sp>
+    </p:spTree>
+    <p:extLst>
+      <p:ext uri="{BB962C8B-B14F-4D97-AF65-F5344CB8AC3E}">
+        <p14:creationId xmlns:p14="http://schemas.microsoft.com/office/powerpoint/2010/main" val="608338907"/>
+      </p:ext>
+    </p:extLst>
+  </p:cSld>
+  <p:clrMapOvr>
+    <a:masterClrMapping/>
+  </p:clrMapOvr>
+</p:sld>
+</file>
+
+<file path=ppt/slides/slide12.xml><?xml version="1.0" encoding="utf-8"?>
+<p:sld xmlns:a="http://schemas.openxmlformats.org/drawingml/2006/main" xmlns:r="http://schemas.openxmlformats.org/officeDocument/2006/relationships" xmlns:p="http://schemas.openxmlformats.org/presentationml/2006/main">
+  <p:cSld>
+    <p:spTree>
+      <p:nvGrpSpPr>
+        <p:cNvPr id="1" name=""/>
+        <p:cNvGrpSpPr/>
+        <p:nvPr/>
+      </p:nvGrpSpPr>
+      <p:grpSpPr>
+        <a:xfrm>
+          <a:off x="0" y="0"/>
+          <a:ext cx="0" cy="0"/>
+          <a:chOff x="0" y="0"/>
+          <a:chExt cx="0" cy="0"/>
+        </a:xfrm>
+      </p:grpSpPr>
+      <p:sp>
+        <p:nvSpPr>
+          <p:cNvPr id="2" name="Title 1"/>
+          <p:cNvSpPr>
+            <a:spLocks noGrp="1"/>
+          </p:cNvSpPr>
+          <p:nvPr>
+            <p:ph type="title"/>
+          </p:nvPr>
+        </p:nvSpPr>
+        <p:spPr>
+          <a:xfrm>
+            <a:off x="1295400" y="1"/>
+            <a:ext cx="10018713" cy="990600"/>
+          </a:xfrm>
+        </p:spPr>
+        <p:txBody>
+          <a:bodyPr/>
+          <a:lstStyle/>
+          <a:p>
+            <a:r>
+              <a:rPr lang="en-US" dirty="0" err="1" smtClean="0"/>
+              <a:t>RandomForest</a:t>
+            </a:r>
+            <a:r>
+              <a:rPr lang="en-US" dirty="0" smtClean="0"/>
+              <a:t> (Recap)</a:t>
+            </a:r>
+            <a:endParaRPr lang="en-IN" dirty="0"/>
+          </a:p>
+        </p:txBody>
+      </p:sp>
+      <p:pic>
+        <p:nvPicPr>
+          <p:cNvPr id="4" name="Content Placeholder 4"/>
+          <p:cNvPicPr>
+            <a:picLocks noGrp="1" noChangeAspect="1"/>
+          </p:cNvPicPr>
+          <p:nvPr>
+            <p:ph idx="1"/>
+          </p:nvPr>
+        </p:nvPicPr>
+        <p:blipFill>
+          <a:blip r:embed="rId2"/>
+          <a:stretch>
+            <a:fillRect/>
+          </a:stretch>
+        </p:blipFill>
+        <p:spPr>
+          <a:xfrm>
+            <a:off x="6942221" y="3021926"/>
+            <a:ext cx="5165559" cy="3752600"/>
+          </a:xfrm>
+          <a:prstGeom prst="rect">
+            <a:avLst/>
+          </a:prstGeom>
+        </p:spPr>
+      </p:pic>
+      <p:sp>
+        <p:nvSpPr>
+          <p:cNvPr id="5" name="Content Placeholder 2"/>
+          <p:cNvSpPr txBox="1">
+            <a:spLocks/>
+          </p:cNvSpPr>
+          <p:nvPr/>
+        </p:nvSpPr>
+        <p:spPr>
+          <a:xfrm>
+            <a:off x="2133600" y="1447800"/>
+            <a:ext cx="9906000" cy="5717090"/>
+          </a:xfrm>
+          <a:prstGeom prst="rect">
+            <a:avLst/>
+          </a:prstGeom>
+        </p:spPr>
+        <p:txBody>
+          <a:bodyPr vert="horz" lIns="91440" tIns="45720" rIns="91440" bIns="45720" rtlCol="0" anchor="ctr">
+            <a:normAutofit/>
+          </a:bodyPr>
+          <a:lstStyle>
+            <a:lvl1pPr marL="285750" indent="-285750" algn="l" defTabSz="457200" rtl="0" eaLnBrk="1" latinLnBrk="0" hangingPunct="1">
+              <a:spcBef>
+                <a:spcPct val="20000"/>
+              </a:spcBef>
+              <a:spcAft>
+                <a:spcPts val="600"/>
+              </a:spcAft>
+              <a:buClr>
+                <a:schemeClr val="accent1">
+                  <a:lumMod val="75000"/>
+                </a:schemeClr>
+              </a:buClr>
+              <a:buSzPct val="145000"/>
+              <a:buFont typeface="Arial"/>
+              <a:buChar char="•"/>
+              <a:defRPr sz="2400" kern="1200" cap="none">
+                <a:solidFill>
+                  <a:schemeClr val="tx1"/>
+                </a:solidFill>
+                <a:effectLst/>
+                <a:latin typeface="+mn-lt"/>
+                <a:ea typeface="+mn-ea"/>
+                <a:cs typeface="+mn-cs"/>
+              </a:defRPr>
+            </a:lvl1pPr>
+            <a:lvl2pPr marL="742950" indent="-285750" algn="l" defTabSz="457200" rtl="0" eaLnBrk="1" latinLnBrk="0" hangingPunct="1">
+              <a:spcBef>
+                <a:spcPct val="20000"/>
+              </a:spcBef>
+              <a:spcAft>
+                <a:spcPts val="600"/>
+              </a:spcAft>
+              <a:buClr>
+                <a:schemeClr val="accent1">
+                  <a:lumMod val="75000"/>
+                </a:schemeClr>
+              </a:buClr>
+              <a:buSzPct val="145000"/>
+              <a:buFont typeface="Arial"/>
+              <a:buChar char="•"/>
+              <a:defRPr sz="2000" kern="1200" cap="none">
+                <a:solidFill>
+                  <a:schemeClr val="tx1"/>
+                </a:solidFill>
+                <a:effectLst/>
+                <a:latin typeface="+mn-lt"/>
+                <a:ea typeface="+mn-ea"/>
+                <a:cs typeface="+mn-cs"/>
+              </a:defRPr>
+            </a:lvl2pPr>
+            <a:lvl3pPr marL="1200150" indent="-285750" algn="l" defTabSz="457200" rtl="0" eaLnBrk="1" latinLnBrk="0" hangingPunct="1">
+              <a:spcBef>
+                <a:spcPct val="20000"/>
+              </a:spcBef>
+              <a:spcAft>
+                <a:spcPts val="600"/>
+              </a:spcAft>
+              <a:buClr>
+                <a:schemeClr val="accent1">
+                  <a:lumMod val="75000"/>
+                </a:schemeClr>
+              </a:buClr>
+              <a:buSzPct val="145000"/>
+              <a:buFont typeface="Arial"/>
+              <a:buChar char="•"/>
+              <a:defRPr sz="1800" kern="1200" cap="none">
+                <a:solidFill>
+                  <a:schemeClr val="tx1"/>
+                </a:solidFill>
+                <a:effectLst/>
+                <a:latin typeface="+mn-lt"/>
+                <a:ea typeface="+mn-ea"/>
+                <a:cs typeface="+mn-cs"/>
+              </a:defRPr>
+            </a:lvl3pPr>
+            <a:lvl4pPr marL="1543050" indent="-171450" algn="l" defTabSz="457200" rtl="0" eaLnBrk="1" latinLnBrk="0" hangingPunct="1">
+              <a:spcBef>
+                <a:spcPct val="20000"/>
+              </a:spcBef>
+              <a:spcAft>
+                <a:spcPts val="600"/>
+              </a:spcAft>
+              <a:buClr>
+                <a:schemeClr val="accent1">
+                  <a:lumMod val="75000"/>
+                </a:schemeClr>
+              </a:buClr>
+              <a:buSzPct val="145000"/>
+              <a:buFont typeface="Arial"/>
+              <a:buChar char="•"/>
+              <a:defRPr sz="1600" kern="1200" cap="none">
+                <a:solidFill>
+                  <a:schemeClr val="tx1"/>
+                </a:solidFill>
+                <a:effectLst/>
+                <a:latin typeface="+mn-lt"/>
+                <a:ea typeface="+mn-ea"/>
+                <a:cs typeface="+mn-cs"/>
+              </a:defRPr>
+            </a:lvl4pPr>
+            <a:lvl5pPr marL="2000250" indent="-171450" algn="l" defTabSz="457200" rtl="0" eaLnBrk="1" latinLnBrk="0" hangingPunct="1">
+              <a:spcBef>
+                <a:spcPct val="20000"/>
+              </a:spcBef>
+              <a:spcAft>
+                <a:spcPts val="600"/>
+              </a:spcAft>
+              <a:buClr>
+                <a:schemeClr val="accent1">
+                  <a:lumMod val="75000"/>
+                </a:schemeClr>
+              </a:buClr>
+              <a:buSzPct val="145000"/>
+              <a:buFont typeface="Arial"/>
+              <a:buChar char="•"/>
+              <a:defRPr sz="1400" kern="1200" cap="none">
+                <a:solidFill>
+                  <a:schemeClr val="tx1"/>
+                </a:solidFill>
+                <a:effectLst/>
+                <a:latin typeface="+mn-lt"/>
+                <a:ea typeface="+mn-ea"/>
+                <a:cs typeface="+mn-cs"/>
+              </a:defRPr>
+            </a:lvl5pPr>
+            <a:lvl6pPr marL="2514600" indent="-228600" algn="l" defTabSz="457200" rtl="0" eaLnBrk="1" latinLnBrk="0" hangingPunct="1">
+              <a:spcBef>
+                <a:spcPct val="20000"/>
+              </a:spcBef>
+              <a:spcAft>
+                <a:spcPts val="600"/>
+              </a:spcAft>
+              <a:buClr>
+                <a:schemeClr val="accent1">
+                  <a:lumMod val="75000"/>
+                </a:schemeClr>
+              </a:buClr>
+              <a:buSzPct val="145000"/>
+              <a:buFont typeface="Arial"/>
+              <a:buChar char="•"/>
+              <a:defRPr sz="1400" kern="1200" cap="none">
+                <a:solidFill>
+                  <a:schemeClr val="tx1"/>
+                </a:solidFill>
+                <a:effectLst/>
+                <a:latin typeface="+mn-lt"/>
+                <a:ea typeface="+mn-ea"/>
+                <a:cs typeface="+mn-cs"/>
+              </a:defRPr>
+            </a:lvl6pPr>
+            <a:lvl7pPr marL="2971800" indent="-228600" algn="l" defTabSz="457200" rtl="0" eaLnBrk="1" latinLnBrk="0" hangingPunct="1">
+              <a:spcBef>
+                <a:spcPct val="20000"/>
+              </a:spcBef>
+              <a:spcAft>
+                <a:spcPts val="600"/>
+              </a:spcAft>
+              <a:buClr>
+                <a:schemeClr val="accent1">
+                  <a:lumMod val="75000"/>
+                </a:schemeClr>
+              </a:buClr>
+              <a:buSzPct val="145000"/>
+              <a:buFont typeface="Arial"/>
+              <a:buChar char="•"/>
+              <a:defRPr sz="1400" kern="1200" cap="none">
+                <a:solidFill>
+                  <a:schemeClr val="tx1"/>
+                </a:solidFill>
+                <a:effectLst/>
+                <a:latin typeface="+mn-lt"/>
+                <a:ea typeface="+mn-ea"/>
+                <a:cs typeface="+mn-cs"/>
+              </a:defRPr>
+            </a:lvl7pPr>
+            <a:lvl8pPr marL="3429000" indent="-228600" algn="l" defTabSz="457200" rtl="0" eaLnBrk="1" latinLnBrk="0" hangingPunct="1">
+              <a:spcBef>
+                <a:spcPct val="20000"/>
+              </a:spcBef>
+              <a:spcAft>
+                <a:spcPts val="600"/>
+              </a:spcAft>
+              <a:buClr>
+                <a:schemeClr val="accent1">
+                  <a:lumMod val="75000"/>
+                </a:schemeClr>
+              </a:buClr>
+              <a:buSzPct val="145000"/>
+              <a:buFont typeface="Arial"/>
+              <a:buChar char="•"/>
+              <a:defRPr sz="1400" kern="1200" cap="none">
+                <a:solidFill>
+                  <a:schemeClr val="tx1"/>
+                </a:solidFill>
+                <a:effectLst/>
+                <a:latin typeface="+mn-lt"/>
+                <a:ea typeface="+mn-ea"/>
+                <a:cs typeface="+mn-cs"/>
+              </a:defRPr>
+            </a:lvl8pPr>
+            <a:lvl9pPr marL="3886200" indent="-228600" algn="l" defTabSz="457200" rtl="0" eaLnBrk="1" latinLnBrk="0" hangingPunct="1">
+              <a:spcBef>
+                <a:spcPct val="20000"/>
+              </a:spcBef>
+              <a:spcAft>
+                <a:spcPts val="600"/>
+              </a:spcAft>
+              <a:buClr>
+                <a:schemeClr val="accent1">
+                  <a:lumMod val="75000"/>
+                </a:schemeClr>
+              </a:buClr>
+              <a:buSzPct val="145000"/>
+              <a:buFont typeface="Arial"/>
+              <a:buChar char="•"/>
+              <a:defRPr sz="1400" kern="1200" cap="none">
+                <a:solidFill>
+                  <a:schemeClr val="tx1"/>
+                </a:solidFill>
+                <a:effectLst/>
+                <a:latin typeface="+mn-lt"/>
+                <a:ea typeface="+mn-ea"/>
+                <a:cs typeface="+mn-cs"/>
+              </a:defRPr>
+            </a:lvl9pPr>
+          </a:lstStyle>
+          <a:p>
+            <a:pPr lvl="1"/>
+            <a:endParaRPr lang="en-IN" dirty="0"/>
+          </a:p>
+        </p:txBody>
+      </p:sp>
+      <p:sp>
+        <p:nvSpPr>
+          <p:cNvPr id="6" name="Rectangle 5"/>
+          <p:cNvSpPr/>
+          <p:nvPr/>
+        </p:nvSpPr>
+        <p:spPr>
+          <a:xfrm>
+            <a:off x="1828800" y="990601"/>
+            <a:ext cx="10210800" cy="2031325"/>
+          </a:xfrm>
+          <a:prstGeom prst="rect">
+            <a:avLst/>
+          </a:prstGeom>
+        </p:spPr>
+        <p:txBody>
+          <a:bodyPr wrap="square">
+            <a:spAutoFit/>
+          </a:bodyPr>
+          <a:lstStyle/>
+          <a:p>
+            <a:r>
+              <a:rPr lang="en-US" dirty="0"/>
+              <a:t>Random forests include three main tuning </a:t>
+            </a:r>
+            <a:r>
+              <a:rPr lang="en-US" dirty="0" smtClean="0"/>
+              <a:t>parameters:</a:t>
+            </a:r>
+            <a:endParaRPr lang="en-US" dirty="0"/>
+          </a:p>
+          <a:p>
+            <a:pPr marL="742950" lvl="1" indent="-285750">
+              <a:buFont typeface="Arial" panose="020B0604020202020204" pitchFamily="34" charset="0"/>
+              <a:buChar char="•"/>
+            </a:pPr>
+            <a:r>
+              <a:rPr lang="en-US" b="1" dirty="0"/>
+              <a:t>Node Size:</a:t>
+            </a:r>
+            <a:r>
+              <a:rPr lang="en-US" dirty="0"/>
+              <a:t> unlike in decision trees, the number of observations in the terminal nodes of each tree of the forest can be very small. The goal is to grow trees with as little bias as possible.</a:t>
+            </a:r>
+          </a:p>
+          <a:p>
+            <a:pPr marL="742950" lvl="1" indent="-285750">
+              <a:buFont typeface="Arial" panose="020B0604020202020204" pitchFamily="34" charset="0"/>
+              <a:buChar char="•"/>
+            </a:pPr>
+            <a:r>
+              <a:rPr lang="en-US" b="1" dirty="0"/>
+              <a:t>Number of Trees:</a:t>
+            </a:r>
+            <a:r>
+              <a:rPr lang="en-US" dirty="0"/>
+              <a:t> in practice, 500 trees is often a good choice.</a:t>
+            </a:r>
+          </a:p>
+          <a:p>
+            <a:pPr marL="742950" lvl="1" indent="-285750">
+              <a:buFont typeface="Arial" panose="020B0604020202020204" pitchFamily="34" charset="0"/>
+              <a:buChar char="•"/>
+            </a:pPr>
+            <a:r>
+              <a:rPr lang="en-US" b="1" dirty="0"/>
+              <a:t>Number of Predictors Sampled: </a:t>
+            </a:r>
+            <a:r>
+              <a:rPr lang="en-US" dirty="0"/>
+              <a:t>the number of predictors sampled at each split would seem to be a key tuning parameter that should affect how well random forests perform. Sampling 2-5 each time is often adequate.</a:t>
+            </a:r>
+            <a:endParaRPr lang="en-IN" dirty="0"/>
+          </a:p>
+        </p:txBody>
+      </p:sp>
+    </p:spTree>
+    <p:extLst>
+      <p:ext uri="{BB962C8B-B14F-4D97-AF65-F5344CB8AC3E}">
+        <p14:creationId xmlns:p14="http://schemas.microsoft.com/office/powerpoint/2010/main" val="751711149"/>
+      </p:ext>
+    </p:extLst>
+  </p:cSld>
+  <p:clrMapOvr>
+    <a:masterClrMapping/>
+  </p:clrMapOvr>
+</p:sld>
+</file>
+
+<file path=ppt/slides/slide13.xml><?xml version="1.0" encoding="utf-8"?>
+<p:sld xmlns:a="http://schemas.openxmlformats.org/drawingml/2006/main" xmlns:r="http://schemas.openxmlformats.org/officeDocument/2006/relationships" xmlns:p="http://schemas.openxmlformats.org/presentationml/2006/main">
+  <p:cSld>
+    <p:spTree>
+      <p:nvGrpSpPr>
+        <p:cNvPr id="1" name=""/>
+        <p:cNvGrpSpPr/>
+        <p:nvPr/>
+      </p:nvGrpSpPr>
+      <p:grpSpPr>
+        <a:xfrm>
+          <a:off x="0" y="0"/>
+          <a:ext cx="0" cy="0"/>
+          <a:chOff x="0" y="0"/>
+          <a:chExt cx="0" cy="0"/>
+        </a:xfrm>
+      </p:grpSpPr>
+      <p:sp>
+        <p:nvSpPr>
+          <p:cNvPr id="2" name="Title 1"/>
+          <p:cNvSpPr>
+            <a:spLocks noGrp="1"/>
+          </p:cNvSpPr>
+          <p:nvPr>
+            <p:ph type="title"/>
+          </p:nvPr>
+        </p:nvSpPr>
         <p:spPr>
           <a:xfrm>
             <a:off x="1447240" y="19911"/>
@@ -7122,11 +7405,7 @@
             </a:r>
             <a:r>
               <a:rPr lang="en-US" dirty="0" smtClean="0"/>
-              <a:t> </a:t>
-            </a:r>
-            <a:r>
-              <a:rPr lang="en-US" dirty="0" smtClean="0"/>
-              <a:t>Index (Recap)</a:t>
+              <a:t> Index (Recap)</a:t>
             </a:r>
             <a:endParaRPr lang="en-IN" dirty="0"/>
           </a:p>
@@ -7527,7 +7806,7 @@
 </p:sld>
 </file>
 
-<file path=ppt/slides/slide12.xml><?xml version="1.0" encoding="utf-8"?>
+<file path=ppt/slides/slide14.xml><?xml version="1.0" encoding="utf-8"?>
 <p:sld xmlns:a="http://schemas.openxmlformats.org/drawingml/2006/main" xmlns:r="http://schemas.openxmlformats.org/officeDocument/2006/relationships" xmlns:p="http://schemas.openxmlformats.org/presentationml/2006/main">
   <p:cSld>
     <p:spTree>
@@ -7664,13 +7943,8 @@
           <a:p>
             <a:r>
               <a:rPr lang="en-US" dirty="0" smtClean="0"/>
-              <a:t> Girish Gore : 10+ Years of Experience in Data Analytics / Data </a:t>
-            </a:r>
-            <a:r>
-              <a:rPr lang="en-US" dirty="0" smtClean="0"/>
-              <a:t>Science</a:t>
-            </a:r>
-            <a:endParaRPr lang="en-US" dirty="0" smtClean="0"/>
+              <a:t> Girish Gore : 10+ Years of Experience in Data Analytics / Data Science</a:t>
+            </a:r>
           </a:p>
           <a:p>
             <a:r>
@@ -7702,17 +7976,8 @@
             </a:r>
             <a:r>
               <a:rPr lang="en-US" dirty="0" smtClean="0"/>
-              <a:t>B.E</a:t>
-            </a:r>
-            <a:r>
-              <a:rPr lang="en-US" dirty="0" smtClean="0"/>
-              <a:t>. Computer Science from VIT </a:t>
-            </a:r>
-            <a:r>
-              <a:rPr lang="en-US" dirty="0" smtClean="0"/>
-              <a:t>Pune</a:t>
-            </a:r>
-            <a:endParaRPr lang="en-US" dirty="0" smtClean="0"/>
+              <a:t>B.E. Computer Science from VIT Pune</a:t>
+            </a:r>
           </a:p>
           <a:p>
             <a:r>
@@ -7766,26 +8031,14 @@
             <a:pPr lvl="1"/>
             <a:r>
               <a:rPr lang="en-US" dirty="0" smtClean="0"/>
-              <a:t>Dynamic Pricing ,</a:t>
-            </a:r>
+              <a:t>Dynamic Pricing ,Forecasting and Optimization</a:t>
+            </a:r>
+          </a:p>
+          <a:p>
+            <a:pPr lvl="1"/>
             <a:r>
               <a:rPr lang="en-US" dirty="0" smtClean="0"/>
-              <a:t>Forecasting </a:t>
-            </a:r>
-            <a:r>
-              <a:rPr lang="en-US" dirty="0" smtClean="0"/>
-              <a:t>and Optimization</a:t>
-            </a:r>
-          </a:p>
-          <a:p>
-            <a:pPr lvl="1"/>
-            <a:r>
-              <a:rPr lang="en-US" dirty="0" smtClean="0"/>
-              <a:t>Recommender </a:t>
-            </a:r>
-            <a:r>
-              <a:rPr lang="en-US" dirty="0" smtClean="0"/>
-              <a:t>Systems</a:t>
+              <a:t>Recommender Systems</a:t>
             </a:r>
           </a:p>
           <a:p>
@@ -7794,7 +8047,6 @@
               <a:rPr lang="en-US" dirty="0" smtClean="0"/>
               <a:t>Business Metric Generation </a:t>
             </a:r>
-            <a:endParaRPr lang="en-US" dirty="0" smtClean="0"/>
           </a:p>
           <a:p>
             <a:pPr lvl="1"/>
@@ -8830,7 +9082,7 @@
         <p:spPr>
           <a:xfrm>
             <a:off x="1484309" y="1"/>
-            <a:ext cx="10018713" cy="1371600"/>
+            <a:ext cx="10018713" cy="990599"/>
           </a:xfrm>
         </p:spPr>
         <p:txBody>
@@ -8859,12 +9111,174 @@
             <p:ph idx="1"/>
           </p:nvPr>
         </p:nvSpPr>
-        <p:spPr/>
-        <p:txBody>
-          <a:bodyPr/>
+        <p:spPr>
+          <a:xfrm>
+            <a:off x="1484309" y="990600"/>
+            <a:ext cx="10326692" cy="5410200"/>
+          </a:xfrm>
+        </p:spPr>
+        <p:txBody>
+          <a:bodyPr>
+            <a:normAutofit fontScale="92500" lnSpcReduction="10000"/>
+          </a:bodyPr>
           <a:lstStyle/>
           <a:p>
-            <a:endParaRPr lang="en-IN"/>
+            <a:r>
+              <a:rPr lang="en-IN" dirty="0"/>
+              <a:t>It's an extensive, well-documented, and accessible, curated library of machine-learning </a:t>
+            </a:r>
+            <a:r>
+              <a:rPr lang="en-IN" dirty="0" smtClean="0"/>
+              <a:t>models</a:t>
+            </a:r>
+          </a:p>
+          <a:p>
+            <a:r>
+              <a:rPr lang="en-US" dirty="0" smtClean="0"/>
+              <a:t>It is built upon </a:t>
+            </a:r>
+            <a:r>
+              <a:rPr lang="en-US" dirty="0" err="1" smtClean="0"/>
+              <a:t>Scipy</a:t>
+            </a:r>
+            <a:r>
+              <a:rPr lang="en-US" dirty="0" smtClean="0"/>
+              <a:t> library which includes following primary libraries</a:t>
+            </a:r>
+          </a:p>
+          <a:p>
+            <a:pPr lvl="1" fontAlgn="base"/>
+            <a:r>
+              <a:rPr lang="en-IN" b="1" dirty="0" err="1" smtClean="0"/>
+              <a:t>SciPy</a:t>
+            </a:r>
+            <a:r>
+              <a:rPr lang="en-IN" dirty="0"/>
+              <a:t>: Fundamental library for scientific </a:t>
+            </a:r>
+            <a:r>
+              <a:rPr lang="en-IN" dirty="0" smtClean="0"/>
+              <a:t>computing</a:t>
+            </a:r>
+          </a:p>
+          <a:p>
+            <a:pPr lvl="1" fontAlgn="base"/>
+            <a:r>
+              <a:rPr lang="en-IN" b="1" dirty="0" err="1"/>
+              <a:t>NumPy</a:t>
+            </a:r>
+            <a:r>
+              <a:rPr lang="en-IN" dirty="0"/>
+              <a:t>: Base n-dimensional array </a:t>
+            </a:r>
+            <a:r>
+              <a:rPr lang="en-IN" dirty="0" smtClean="0"/>
+              <a:t>package</a:t>
+            </a:r>
+            <a:endParaRPr lang="en-IN" dirty="0"/>
+          </a:p>
+          <a:p>
+            <a:pPr lvl="1" fontAlgn="base"/>
+            <a:r>
+              <a:rPr lang="en-IN" b="1" dirty="0" err="1"/>
+              <a:t>Matplotlib</a:t>
+            </a:r>
+            <a:r>
+              <a:rPr lang="en-IN" dirty="0"/>
+              <a:t>: Comprehensive 2D/3D plotting</a:t>
+            </a:r>
+          </a:p>
+          <a:p>
+            <a:pPr lvl="1" fontAlgn="base"/>
+            <a:r>
+              <a:rPr lang="en-IN" b="1" dirty="0" err="1"/>
+              <a:t>IPython</a:t>
+            </a:r>
+            <a:r>
+              <a:rPr lang="en-IN" dirty="0"/>
+              <a:t>: Enhanced interactive console</a:t>
+            </a:r>
+          </a:p>
+          <a:p>
+            <a:pPr lvl="1" fontAlgn="base"/>
+            <a:r>
+              <a:rPr lang="en-IN" b="1" dirty="0" err="1"/>
+              <a:t>Sympy</a:t>
+            </a:r>
+            <a:r>
+              <a:rPr lang="en-IN" dirty="0"/>
+              <a:t>: Symbolic mathematics</a:t>
+            </a:r>
+          </a:p>
+          <a:p>
+            <a:pPr lvl="1" fontAlgn="base"/>
+            <a:r>
+              <a:rPr lang="en-IN" b="1" dirty="0"/>
+              <a:t>Pandas</a:t>
+            </a:r>
+            <a:r>
+              <a:rPr lang="en-IN" dirty="0"/>
+              <a:t>: Data structures and </a:t>
+            </a:r>
+            <a:r>
+              <a:rPr lang="en-IN" dirty="0" smtClean="0"/>
+              <a:t>analysis</a:t>
+            </a:r>
+          </a:p>
+          <a:p>
+            <a:pPr lvl="1" fontAlgn="base"/>
+            <a:r>
+              <a:rPr lang="en-US" b="1" dirty="0" err="1" smtClean="0"/>
+              <a:t>Seaborn</a:t>
+            </a:r>
+            <a:r>
+              <a:rPr lang="en-US" dirty="0" smtClean="0"/>
+              <a:t> : Visualization library based on </a:t>
+            </a:r>
+            <a:r>
+              <a:rPr lang="en-US" dirty="0" err="1" smtClean="0"/>
+              <a:t>matplotlib</a:t>
+            </a:r>
+            <a:endParaRPr lang="en-IN" dirty="0" smtClean="0"/>
+          </a:p>
+          <a:p>
+            <a:r>
+              <a:rPr lang="en-IN" b="1" dirty="0" err="1" smtClean="0">
+                <a:solidFill>
+                  <a:srgbClr val="0070C0"/>
+                </a:solidFill>
+              </a:rPr>
+              <a:t>Numpy</a:t>
+            </a:r>
+            <a:r>
+              <a:rPr lang="en-IN" dirty="0" smtClean="0"/>
+              <a:t> </a:t>
+            </a:r>
+            <a:r>
+              <a:rPr lang="en-IN" dirty="0"/>
+              <a:t>provides a high-performance multidimensional array and basic tools to compute with and manipulate these arrays. </a:t>
+            </a:r>
+            <a:r>
+              <a:rPr lang="en-IN" b="1" dirty="0" err="1">
+                <a:solidFill>
+                  <a:srgbClr val="0070C0"/>
+                </a:solidFill>
+                <a:hlinkClick r:id="rId2"/>
+              </a:rPr>
+              <a:t>SciPy</a:t>
+            </a:r>
+            <a:r>
+              <a:rPr lang="en-IN" dirty="0"/>
+              <a:t> builds on this, and provides a large number of functions that operate on </a:t>
+            </a:r>
+            <a:r>
+              <a:rPr lang="en-IN" dirty="0" err="1"/>
+              <a:t>numpy</a:t>
+            </a:r>
+            <a:r>
+              <a:rPr lang="en-IN" dirty="0"/>
+              <a:t> arrays and are useful for different types of scientific and engineering applications.</a:t>
+            </a:r>
           </a:p>
         </p:txBody>
       </p:sp>
@@ -8910,8 +9324,8 @@
         </p:nvSpPr>
         <p:spPr>
           <a:xfrm>
-            <a:off x="1480299" y="1"/>
-            <a:ext cx="10018713" cy="1143000"/>
+            <a:off x="1512385" y="1"/>
+            <a:ext cx="10018713" cy="1219200"/>
           </a:xfrm>
         </p:spPr>
         <p:txBody>
@@ -8920,7 +9334,19 @@
           <a:p>
             <a:r>
               <a:rPr lang="en-US" dirty="0" smtClean="0"/>
-              <a:t>Steps in Machine Learning</a:t>
+              <a:t>Pros &amp; Cons of Using </a:t>
+            </a:r>
+            <a:r>
+              <a:rPr lang="en-US" dirty="0" err="1"/>
+              <a:t>S</a:t>
+            </a:r>
+            <a:r>
+              <a:rPr lang="en-US" dirty="0" err="1" smtClean="0"/>
+              <a:t>cikit</a:t>
+            </a:r>
+            <a:r>
+              <a:rPr lang="en-US" dirty="0" smtClean="0"/>
+              <a:t> learn</a:t>
             </a:r>
             <a:endParaRPr lang="en-IN" dirty="0"/>
           </a:p>
@@ -8938,140 +9364,103 @@
         </p:nvSpPr>
         <p:spPr>
           <a:xfrm>
-            <a:off x="2133600" y="1447800"/>
-            <a:ext cx="9906000" cy="5717090"/>
+            <a:off x="1512385" y="990600"/>
+            <a:ext cx="10591800" cy="5257800"/>
           </a:xfrm>
         </p:spPr>
         <p:txBody>
           <a:bodyPr>
-            <a:normAutofit fontScale="85000" lnSpcReduction="20000"/>
+            <a:normAutofit fontScale="92500" lnSpcReduction="20000"/>
           </a:bodyPr>
           <a:lstStyle/>
           <a:p>
             <a:r>
-              <a:rPr lang="en-IN" dirty="0"/>
-              <a:t>Gathering data </a:t>
-            </a:r>
-            <a:r>
-              <a:rPr lang="en-IN" dirty="0" smtClean="0"/>
-              <a:t>: Related , Connected , Accurate , Enough</a:t>
-            </a:r>
-            <a:endParaRPr lang="en-US" dirty="0" smtClean="0"/>
-          </a:p>
-          <a:p>
-            <a:r>
               <a:rPr lang="en-US" dirty="0" smtClean="0"/>
-              <a:t>EDA : Exploratory Data Analysis</a:t>
-            </a:r>
-          </a:p>
-          <a:p>
-            <a:pPr lvl="1"/>
+              <a:t>Consistent Interface for Machine Learning Models</a:t>
+            </a:r>
+          </a:p>
+          <a:p>
             <a:r>
               <a:rPr lang="en-US" dirty="0" smtClean="0"/>
-              <a:t>Explore Features as Continues , Categorical , Ordinal &amp; their distributions</a:t>
-            </a:r>
-          </a:p>
-          <a:p>
-            <a:pPr lvl="1"/>
+              <a:t>Provides multiple </a:t>
+            </a:r>
+            <a:r>
+              <a:rPr lang="en-US" dirty="0" err="1" smtClean="0"/>
+              <a:t>tunining</a:t>
+            </a:r>
+            <a:r>
+              <a:rPr lang="en-US" dirty="0"/>
+              <a:t> </a:t>
+            </a:r>
             <a:r>
               <a:rPr lang="en-US" dirty="0" smtClean="0"/>
-              <a:t>Visualizing their relation with each other ; with the dependent variable</a:t>
+              <a:t>parameters with sensible defaults</a:t>
             </a:r>
           </a:p>
           <a:p>
             <a:r>
               <a:rPr lang="en-US" dirty="0" smtClean="0"/>
-              <a:t>Pre Processing the Data</a:t>
-            </a:r>
-          </a:p>
-          <a:p>
-            <a:pPr lvl="1"/>
+              <a:t>Exceptional Documentation</a:t>
+            </a:r>
+          </a:p>
+          <a:p>
             <a:r>
               <a:rPr lang="en-US" dirty="0" smtClean="0"/>
-              <a:t>Feature Generation</a:t>
-            </a:r>
-          </a:p>
-          <a:p>
-            <a:pPr lvl="1"/>
+              <a:t>Rich set  of functionality support </a:t>
+            </a:r>
+          </a:p>
+          <a:p>
             <a:r>
               <a:rPr lang="en-US" dirty="0" smtClean="0"/>
-              <a:t>Feature Elimination</a:t>
-            </a:r>
-          </a:p>
-          <a:p>
-            <a:pPr lvl="1"/>
+              <a:t>Active support and development</a:t>
+            </a:r>
+          </a:p>
+          <a:p>
+            <a:endParaRPr lang="en-US" dirty="0"/>
+          </a:p>
+          <a:p>
+            <a:pPr marL="0" indent="0">
+              <a:buNone/>
+            </a:pPr>
             <a:r>
               <a:rPr lang="en-US" dirty="0" smtClean="0"/>
-              <a:t>Feature Transformation</a:t>
-            </a:r>
-          </a:p>
-          <a:p>
-            <a:pPr lvl="2"/>
+              <a:t>Potential Cons …</a:t>
+            </a:r>
+          </a:p>
+          <a:p>
             <a:r>
               <a:rPr lang="en-US" dirty="0" smtClean="0"/>
-              <a:t>Continues Variables :  Center , Scale , Box Cox</a:t>
-            </a:r>
-          </a:p>
-          <a:p>
-            <a:pPr lvl="2"/>
+              <a:t>Steep learning curve than R</a:t>
+            </a:r>
+          </a:p>
+          <a:p>
             <a:r>
               <a:rPr lang="en-US" dirty="0" smtClean="0"/>
-              <a:t>Categorical Variable :  Label Encoding ; One Hot Encoding </a:t>
-            </a:r>
-          </a:p>
-          <a:p>
-            <a:r>
-              <a:rPr lang="en-IN" dirty="0"/>
-              <a:t>Choosing the right algorithm / </a:t>
-            </a:r>
-            <a:r>
-              <a:rPr lang="en-IN" dirty="0" smtClean="0"/>
-              <a:t>model</a:t>
-            </a:r>
-            <a:endParaRPr lang="en-US" b="1" dirty="0">
-              <a:solidFill>
-                <a:srgbClr val="00B0F0"/>
-              </a:solidFill>
-            </a:endParaRPr>
-          </a:p>
-          <a:p>
-            <a:r>
-              <a:rPr lang="en-US" dirty="0"/>
-              <a:t>Over fitting vs. Under fitting : Test / Train </a:t>
-            </a:r>
+              <a:t>Machine Learning centric approach makes Interpretability difficult than R</a:t>
+            </a:r>
+          </a:p>
+          <a:p>
+            <a:endParaRPr lang="en-US" dirty="0"/>
+          </a:p>
+          <a:p>
+            <a:pPr marL="0" indent="0">
+              <a:buNone/>
+            </a:pPr>
             <a:r>
               <a:rPr lang="en-US" dirty="0" smtClean="0"/>
-              <a:t>Split Strategies</a:t>
-            </a:r>
-            <a:endParaRPr lang="en-US" b="1" dirty="0">
-              <a:solidFill>
-                <a:srgbClr val="00B0F0"/>
-              </a:solidFill>
-            </a:endParaRPr>
-          </a:p>
-          <a:p>
-            <a:r>
-              <a:rPr lang="en-IN" dirty="0"/>
-              <a:t>Evaluation</a:t>
-            </a:r>
-          </a:p>
-          <a:p>
-            <a:r>
-              <a:rPr lang="en-IN" dirty="0"/>
-              <a:t>Hyper parameter tuning</a:t>
-            </a:r>
-          </a:p>
-          <a:p>
-            <a:r>
-              <a:rPr lang="en-IN" dirty="0"/>
-              <a:t>Prediction</a:t>
-            </a:r>
-          </a:p>
-          <a:p>
-            <a:endParaRPr lang="en-US" dirty="0" smtClean="0"/>
-          </a:p>
-          <a:p>
-            <a:pPr lvl="1"/>
+              <a:t>More Readings :</a:t>
+            </a:r>
+          </a:p>
+          <a:p>
+            <a:pPr marL="0" indent="0">
+              <a:buNone/>
+            </a:pPr>
+            <a:r>
+              <a:rPr lang="en-IN" dirty="0">
+                <a:hlinkClick r:id="rId2"/>
+              </a:rPr>
+              <a:t>https://www.oreilly.com/ideas/six-reasons-why-i-recommend-scikit-learn</a:t>
+            </a:r>
             <a:endParaRPr lang="en-IN" dirty="0"/>
           </a:p>
         </p:txBody>
@@ -9079,7 +9468,7 @@
     </p:spTree>
     <p:extLst>
       <p:ext uri="{BB962C8B-B14F-4D97-AF65-F5344CB8AC3E}">
-        <p14:creationId xmlns:p14="http://schemas.microsoft.com/office/powerpoint/2010/main" val="3281074935"/>
+        <p14:creationId xmlns:p14="http://schemas.microsoft.com/office/powerpoint/2010/main" val="98257360"/>
       </p:ext>
     </p:extLst>
   </p:cSld>

</xml_diff>

<commit_message>
Basics of python via simple program and implementing Quick Sort
</commit_message>
<xml_diff>
--- a/Demo/ML Introduction using Python.pptx
+++ b/Demo/ML Introduction using Python.pptx
@@ -5,7 +5,7 @@
     <p:sldMasterId id="2147483720" r:id="rId1"/>
   </p:sldMasterIdLst>
   <p:notesMasterIdLst>
-    <p:notesMasterId r:id="rId16"/>
+    <p:notesMasterId r:id="rId17"/>
   </p:notesMasterIdLst>
   <p:sldIdLst>
     <p:sldId id="286" r:id="rId2"/>
@@ -21,7 +21,8 @@
     <p:sldId id="313" r:id="rId12"/>
     <p:sldId id="309" r:id="rId13"/>
     <p:sldId id="311" r:id="rId14"/>
-    <p:sldId id="310" r:id="rId15"/>
+    <p:sldId id="314" r:id="rId15"/>
+    <p:sldId id="310" r:id="rId16"/>
   </p:sldIdLst>
   <p:sldSz cx="12192000" cy="6858000"/>
   <p:notesSz cx="12192000" cy="6858000"/>
@@ -7807,6 +7808,642 @@
 </file>
 
 <file path=ppt/slides/slide14.xml><?xml version="1.0" encoding="utf-8"?>
+<p:sld xmlns:a="http://schemas.openxmlformats.org/drawingml/2006/main" xmlns:r="http://schemas.openxmlformats.org/officeDocument/2006/relationships" xmlns:p="http://schemas.openxmlformats.org/presentationml/2006/main">
+  <p:cSld>
+    <p:spTree>
+      <p:nvGrpSpPr>
+        <p:cNvPr id="1" name=""/>
+        <p:cNvGrpSpPr/>
+        <p:nvPr/>
+      </p:nvGrpSpPr>
+      <p:grpSpPr>
+        <a:xfrm>
+          <a:off x="0" y="0"/>
+          <a:ext cx="0" cy="0"/>
+          <a:chOff x="0" y="0"/>
+          <a:chExt cx="0" cy="0"/>
+        </a:xfrm>
+      </p:grpSpPr>
+      <p:sp>
+        <p:nvSpPr>
+          <p:cNvPr id="2" name="Title 1"/>
+          <p:cNvSpPr>
+            <a:spLocks noGrp="1"/>
+          </p:cNvSpPr>
+          <p:nvPr>
+            <p:ph type="title"/>
+          </p:nvPr>
+        </p:nvSpPr>
+        <p:spPr>
+          <a:xfrm>
+            <a:off x="1447800" y="-424840"/>
+            <a:ext cx="10018713" cy="1752599"/>
+          </a:xfrm>
+        </p:spPr>
+        <p:txBody>
+          <a:bodyPr/>
+          <a:lstStyle/>
+          <a:p>
+            <a:r>
+              <a:rPr lang="en-US" dirty="0" smtClean="0"/>
+              <a:t>Confusion Matrix</a:t>
+            </a:r>
+            <a:endParaRPr lang="en-IN" dirty="0"/>
+          </a:p>
+        </p:txBody>
+      </p:sp>
+      <p:pic>
+        <p:nvPicPr>
+          <p:cNvPr id="6" name="Content Placeholder 5"/>
+          <p:cNvPicPr>
+            <a:picLocks noGrp="1" noChangeAspect="1"/>
+          </p:cNvPicPr>
+          <p:nvPr>
+            <p:ph idx="1"/>
+          </p:nvPr>
+        </p:nvPicPr>
+        <p:blipFill>
+          <a:blip r:embed="rId2"/>
+          <a:stretch>
+            <a:fillRect/>
+          </a:stretch>
+        </p:blipFill>
+        <p:spPr>
+          <a:xfrm>
+            <a:off x="3352800" y="2828925"/>
+            <a:ext cx="8664640" cy="3724275"/>
+          </a:xfrm>
+          <a:prstGeom prst="rect">
+            <a:avLst/>
+          </a:prstGeom>
+        </p:spPr>
+      </p:pic>
+      <p:sp>
+        <p:nvSpPr>
+          <p:cNvPr id="5" name="Slide Number Placeholder 4"/>
+          <p:cNvSpPr>
+            <a:spLocks noGrp="1"/>
+          </p:cNvSpPr>
+          <p:nvPr>
+            <p:ph type="sldNum" sz="quarter" idx="12"/>
+          </p:nvPr>
+        </p:nvSpPr>
+        <p:spPr/>
+        <p:txBody>
+          <a:bodyPr/>
+          <a:lstStyle/>
+          <a:p>
+            <a:fld id="{B6F15528-21DE-4FAA-801E-634DDDAF4B2B}" type="slidenum">
+              <a:rPr lang="en-IN" smtClean="0"/>
+              <a:pPr/>
+              <a:t>14</a:t>
+            </a:fld>
+            <a:endParaRPr lang="en-IN"/>
+          </a:p>
+        </p:txBody>
+      </p:sp>
+      <p:sp>
+        <p:nvSpPr>
+          <p:cNvPr id="8" name="Content Placeholder 2"/>
+          <p:cNvSpPr txBox="1">
+            <a:spLocks/>
+          </p:cNvSpPr>
+          <p:nvPr/>
+        </p:nvSpPr>
+        <p:spPr>
+          <a:xfrm>
+            <a:off x="1602287" y="1371600"/>
+            <a:ext cx="10018713" cy="3124201"/>
+          </a:xfrm>
+          <a:prstGeom prst="rect">
+            <a:avLst/>
+          </a:prstGeom>
+        </p:spPr>
+        <p:txBody>
+          <a:bodyPr vert="horz" lIns="91440" tIns="45720" rIns="91440" bIns="45720" rtlCol="0" anchor="ctr">
+            <a:normAutofit/>
+          </a:bodyPr>
+          <a:lstStyle>
+            <a:lvl1pPr marL="285750" indent="-285750" algn="l" defTabSz="457200" rtl="0" eaLnBrk="1" latinLnBrk="0" hangingPunct="1">
+              <a:spcBef>
+                <a:spcPct val="20000"/>
+              </a:spcBef>
+              <a:spcAft>
+                <a:spcPts val="600"/>
+              </a:spcAft>
+              <a:buClr>
+                <a:schemeClr val="accent1">
+                  <a:lumMod val="75000"/>
+                </a:schemeClr>
+              </a:buClr>
+              <a:buSzPct val="145000"/>
+              <a:buFont typeface="Arial"/>
+              <a:buChar char="•"/>
+              <a:defRPr sz="2400" kern="1200" cap="none">
+                <a:solidFill>
+                  <a:schemeClr val="tx1"/>
+                </a:solidFill>
+                <a:effectLst/>
+                <a:latin typeface="+mn-lt"/>
+                <a:ea typeface="+mn-ea"/>
+                <a:cs typeface="+mn-cs"/>
+              </a:defRPr>
+            </a:lvl1pPr>
+            <a:lvl2pPr marL="742950" indent="-285750" algn="l" defTabSz="457200" rtl="0" eaLnBrk="1" latinLnBrk="0" hangingPunct="1">
+              <a:spcBef>
+                <a:spcPct val="20000"/>
+              </a:spcBef>
+              <a:spcAft>
+                <a:spcPts val="600"/>
+              </a:spcAft>
+              <a:buClr>
+                <a:schemeClr val="accent1">
+                  <a:lumMod val="75000"/>
+                </a:schemeClr>
+              </a:buClr>
+              <a:buSzPct val="145000"/>
+              <a:buFont typeface="Arial"/>
+              <a:buChar char="•"/>
+              <a:defRPr sz="2000" kern="1200" cap="none">
+                <a:solidFill>
+                  <a:schemeClr val="tx1"/>
+                </a:solidFill>
+                <a:effectLst/>
+                <a:latin typeface="+mn-lt"/>
+                <a:ea typeface="+mn-ea"/>
+                <a:cs typeface="+mn-cs"/>
+              </a:defRPr>
+            </a:lvl2pPr>
+            <a:lvl3pPr marL="1200150" indent="-285750" algn="l" defTabSz="457200" rtl="0" eaLnBrk="1" latinLnBrk="0" hangingPunct="1">
+              <a:spcBef>
+                <a:spcPct val="20000"/>
+              </a:spcBef>
+              <a:spcAft>
+                <a:spcPts val="600"/>
+              </a:spcAft>
+              <a:buClr>
+                <a:schemeClr val="accent1">
+                  <a:lumMod val="75000"/>
+                </a:schemeClr>
+              </a:buClr>
+              <a:buSzPct val="145000"/>
+              <a:buFont typeface="Arial"/>
+              <a:buChar char="•"/>
+              <a:defRPr sz="1800" kern="1200" cap="none">
+                <a:solidFill>
+                  <a:schemeClr val="tx1"/>
+                </a:solidFill>
+                <a:effectLst/>
+                <a:latin typeface="+mn-lt"/>
+                <a:ea typeface="+mn-ea"/>
+                <a:cs typeface="+mn-cs"/>
+              </a:defRPr>
+            </a:lvl3pPr>
+            <a:lvl4pPr marL="1543050" indent="-171450" algn="l" defTabSz="457200" rtl="0" eaLnBrk="1" latinLnBrk="0" hangingPunct="1">
+              <a:spcBef>
+                <a:spcPct val="20000"/>
+              </a:spcBef>
+              <a:spcAft>
+                <a:spcPts val="600"/>
+              </a:spcAft>
+              <a:buClr>
+                <a:schemeClr val="accent1">
+                  <a:lumMod val="75000"/>
+                </a:schemeClr>
+              </a:buClr>
+              <a:buSzPct val="145000"/>
+              <a:buFont typeface="Arial"/>
+              <a:buChar char="•"/>
+              <a:defRPr sz="1600" kern="1200" cap="none">
+                <a:solidFill>
+                  <a:schemeClr val="tx1"/>
+                </a:solidFill>
+                <a:effectLst/>
+                <a:latin typeface="+mn-lt"/>
+                <a:ea typeface="+mn-ea"/>
+                <a:cs typeface="+mn-cs"/>
+              </a:defRPr>
+            </a:lvl4pPr>
+            <a:lvl5pPr marL="2000250" indent="-171450" algn="l" defTabSz="457200" rtl="0" eaLnBrk="1" latinLnBrk="0" hangingPunct="1">
+              <a:spcBef>
+                <a:spcPct val="20000"/>
+              </a:spcBef>
+              <a:spcAft>
+                <a:spcPts val="600"/>
+              </a:spcAft>
+              <a:buClr>
+                <a:schemeClr val="accent1">
+                  <a:lumMod val="75000"/>
+                </a:schemeClr>
+              </a:buClr>
+              <a:buSzPct val="145000"/>
+              <a:buFont typeface="Arial"/>
+              <a:buChar char="•"/>
+              <a:defRPr sz="1400" kern="1200" cap="none">
+                <a:solidFill>
+                  <a:schemeClr val="tx1"/>
+                </a:solidFill>
+                <a:effectLst/>
+                <a:latin typeface="+mn-lt"/>
+                <a:ea typeface="+mn-ea"/>
+                <a:cs typeface="+mn-cs"/>
+              </a:defRPr>
+            </a:lvl5pPr>
+            <a:lvl6pPr marL="2514600" indent="-228600" algn="l" defTabSz="457200" rtl="0" eaLnBrk="1" latinLnBrk="0" hangingPunct="1">
+              <a:spcBef>
+                <a:spcPct val="20000"/>
+              </a:spcBef>
+              <a:spcAft>
+                <a:spcPts val="600"/>
+              </a:spcAft>
+              <a:buClr>
+                <a:schemeClr val="accent1">
+                  <a:lumMod val="75000"/>
+                </a:schemeClr>
+              </a:buClr>
+              <a:buSzPct val="145000"/>
+              <a:buFont typeface="Arial"/>
+              <a:buChar char="•"/>
+              <a:defRPr sz="1400" kern="1200" cap="none">
+                <a:solidFill>
+                  <a:schemeClr val="tx1"/>
+                </a:solidFill>
+                <a:effectLst/>
+                <a:latin typeface="+mn-lt"/>
+                <a:ea typeface="+mn-ea"/>
+                <a:cs typeface="+mn-cs"/>
+              </a:defRPr>
+            </a:lvl6pPr>
+            <a:lvl7pPr marL="2971800" indent="-228600" algn="l" defTabSz="457200" rtl="0" eaLnBrk="1" latinLnBrk="0" hangingPunct="1">
+              <a:spcBef>
+                <a:spcPct val="20000"/>
+              </a:spcBef>
+              <a:spcAft>
+                <a:spcPts val="600"/>
+              </a:spcAft>
+              <a:buClr>
+                <a:schemeClr val="accent1">
+                  <a:lumMod val="75000"/>
+                </a:schemeClr>
+              </a:buClr>
+              <a:buSzPct val="145000"/>
+              <a:buFont typeface="Arial"/>
+              <a:buChar char="•"/>
+              <a:defRPr sz="1400" kern="1200" cap="none">
+                <a:solidFill>
+                  <a:schemeClr val="tx1"/>
+                </a:solidFill>
+                <a:effectLst/>
+                <a:latin typeface="+mn-lt"/>
+                <a:ea typeface="+mn-ea"/>
+                <a:cs typeface="+mn-cs"/>
+              </a:defRPr>
+            </a:lvl7pPr>
+            <a:lvl8pPr marL="3429000" indent="-228600" algn="l" defTabSz="457200" rtl="0" eaLnBrk="1" latinLnBrk="0" hangingPunct="1">
+              <a:spcBef>
+                <a:spcPct val="20000"/>
+              </a:spcBef>
+              <a:spcAft>
+                <a:spcPts val="600"/>
+              </a:spcAft>
+              <a:buClr>
+                <a:schemeClr val="accent1">
+                  <a:lumMod val="75000"/>
+                </a:schemeClr>
+              </a:buClr>
+              <a:buSzPct val="145000"/>
+              <a:buFont typeface="Arial"/>
+              <a:buChar char="•"/>
+              <a:defRPr sz="1400" kern="1200" cap="none">
+                <a:solidFill>
+                  <a:schemeClr val="tx1"/>
+                </a:solidFill>
+                <a:effectLst/>
+                <a:latin typeface="+mn-lt"/>
+                <a:ea typeface="+mn-ea"/>
+                <a:cs typeface="+mn-cs"/>
+              </a:defRPr>
+            </a:lvl8pPr>
+            <a:lvl9pPr marL="3886200" indent="-228600" algn="l" defTabSz="457200" rtl="0" eaLnBrk="1" latinLnBrk="0" hangingPunct="1">
+              <a:spcBef>
+                <a:spcPct val="20000"/>
+              </a:spcBef>
+              <a:spcAft>
+                <a:spcPts val="600"/>
+              </a:spcAft>
+              <a:buClr>
+                <a:schemeClr val="accent1">
+                  <a:lumMod val="75000"/>
+                </a:schemeClr>
+              </a:buClr>
+              <a:buSzPct val="145000"/>
+              <a:buFont typeface="Arial"/>
+              <a:buChar char="•"/>
+              <a:defRPr sz="1400" kern="1200" cap="none">
+                <a:solidFill>
+                  <a:schemeClr val="tx1"/>
+                </a:solidFill>
+                <a:effectLst/>
+                <a:latin typeface="+mn-lt"/>
+                <a:ea typeface="+mn-ea"/>
+                <a:cs typeface="+mn-cs"/>
+              </a:defRPr>
+            </a:lvl9pPr>
+          </a:lstStyle>
+          <a:p>
+            <a:endParaRPr lang="en-IN" dirty="0"/>
+          </a:p>
+        </p:txBody>
+      </p:sp>
+      <p:sp>
+        <p:nvSpPr>
+          <p:cNvPr id="9" name="Content Placeholder 2"/>
+          <p:cNvSpPr txBox="1">
+            <a:spLocks/>
+          </p:cNvSpPr>
+          <p:nvPr/>
+        </p:nvSpPr>
+        <p:spPr>
+          <a:xfrm>
+            <a:off x="1646020" y="445500"/>
+            <a:ext cx="10018713" cy="3124201"/>
+          </a:xfrm>
+          <a:prstGeom prst="rect">
+            <a:avLst/>
+          </a:prstGeom>
+        </p:spPr>
+        <p:txBody>
+          <a:bodyPr vert="horz" lIns="91440" tIns="45720" rIns="91440" bIns="45720" rtlCol="0" anchor="ctr">
+            <a:normAutofit/>
+          </a:bodyPr>
+          <a:lstStyle>
+            <a:lvl1pPr marL="285750" indent="-285750" algn="l" defTabSz="457200" rtl="0" eaLnBrk="1" latinLnBrk="0" hangingPunct="1">
+              <a:spcBef>
+                <a:spcPct val="20000"/>
+              </a:spcBef>
+              <a:spcAft>
+                <a:spcPts val="600"/>
+              </a:spcAft>
+              <a:buClr>
+                <a:schemeClr val="accent1">
+                  <a:lumMod val="75000"/>
+                </a:schemeClr>
+              </a:buClr>
+              <a:buSzPct val="145000"/>
+              <a:buFont typeface="Arial"/>
+              <a:buChar char="•"/>
+              <a:defRPr sz="2400" kern="1200" cap="none">
+                <a:solidFill>
+                  <a:schemeClr val="tx1"/>
+                </a:solidFill>
+                <a:effectLst/>
+                <a:latin typeface="+mn-lt"/>
+                <a:ea typeface="+mn-ea"/>
+                <a:cs typeface="+mn-cs"/>
+              </a:defRPr>
+            </a:lvl1pPr>
+            <a:lvl2pPr marL="742950" indent="-285750" algn="l" defTabSz="457200" rtl="0" eaLnBrk="1" latinLnBrk="0" hangingPunct="1">
+              <a:spcBef>
+                <a:spcPct val="20000"/>
+              </a:spcBef>
+              <a:spcAft>
+                <a:spcPts val="600"/>
+              </a:spcAft>
+              <a:buClr>
+                <a:schemeClr val="accent1">
+                  <a:lumMod val="75000"/>
+                </a:schemeClr>
+              </a:buClr>
+              <a:buSzPct val="145000"/>
+              <a:buFont typeface="Arial"/>
+              <a:buChar char="•"/>
+              <a:defRPr sz="2000" kern="1200" cap="none">
+                <a:solidFill>
+                  <a:schemeClr val="tx1"/>
+                </a:solidFill>
+                <a:effectLst/>
+                <a:latin typeface="+mn-lt"/>
+                <a:ea typeface="+mn-ea"/>
+                <a:cs typeface="+mn-cs"/>
+              </a:defRPr>
+            </a:lvl2pPr>
+            <a:lvl3pPr marL="1200150" indent="-285750" algn="l" defTabSz="457200" rtl="0" eaLnBrk="1" latinLnBrk="0" hangingPunct="1">
+              <a:spcBef>
+                <a:spcPct val="20000"/>
+              </a:spcBef>
+              <a:spcAft>
+                <a:spcPts val="600"/>
+              </a:spcAft>
+              <a:buClr>
+                <a:schemeClr val="accent1">
+                  <a:lumMod val="75000"/>
+                </a:schemeClr>
+              </a:buClr>
+              <a:buSzPct val="145000"/>
+              <a:buFont typeface="Arial"/>
+              <a:buChar char="•"/>
+              <a:defRPr sz="1800" kern="1200" cap="none">
+                <a:solidFill>
+                  <a:schemeClr val="tx1"/>
+                </a:solidFill>
+                <a:effectLst/>
+                <a:latin typeface="+mn-lt"/>
+                <a:ea typeface="+mn-ea"/>
+                <a:cs typeface="+mn-cs"/>
+              </a:defRPr>
+            </a:lvl3pPr>
+            <a:lvl4pPr marL="1543050" indent="-171450" algn="l" defTabSz="457200" rtl="0" eaLnBrk="1" latinLnBrk="0" hangingPunct="1">
+              <a:spcBef>
+                <a:spcPct val="20000"/>
+              </a:spcBef>
+              <a:spcAft>
+                <a:spcPts val="600"/>
+              </a:spcAft>
+              <a:buClr>
+                <a:schemeClr val="accent1">
+                  <a:lumMod val="75000"/>
+                </a:schemeClr>
+              </a:buClr>
+              <a:buSzPct val="145000"/>
+              <a:buFont typeface="Arial"/>
+              <a:buChar char="•"/>
+              <a:defRPr sz="1600" kern="1200" cap="none">
+                <a:solidFill>
+                  <a:schemeClr val="tx1"/>
+                </a:solidFill>
+                <a:effectLst/>
+                <a:latin typeface="+mn-lt"/>
+                <a:ea typeface="+mn-ea"/>
+                <a:cs typeface="+mn-cs"/>
+              </a:defRPr>
+            </a:lvl4pPr>
+            <a:lvl5pPr marL="2000250" indent="-171450" algn="l" defTabSz="457200" rtl="0" eaLnBrk="1" latinLnBrk="0" hangingPunct="1">
+              <a:spcBef>
+                <a:spcPct val="20000"/>
+              </a:spcBef>
+              <a:spcAft>
+                <a:spcPts val="600"/>
+              </a:spcAft>
+              <a:buClr>
+                <a:schemeClr val="accent1">
+                  <a:lumMod val="75000"/>
+                </a:schemeClr>
+              </a:buClr>
+              <a:buSzPct val="145000"/>
+              <a:buFont typeface="Arial"/>
+              <a:buChar char="•"/>
+              <a:defRPr sz="1400" kern="1200" cap="none">
+                <a:solidFill>
+                  <a:schemeClr val="tx1"/>
+                </a:solidFill>
+                <a:effectLst/>
+                <a:latin typeface="+mn-lt"/>
+                <a:ea typeface="+mn-ea"/>
+                <a:cs typeface="+mn-cs"/>
+              </a:defRPr>
+            </a:lvl5pPr>
+            <a:lvl6pPr marL="2514600" indent="-228600" algn="l" defTabSz="457200" rtl="0" eaLnBrk="1" latinLnBrk="0" hangingPunct="1">
+              <a:spcBef>
+                <a:spcPct val="20000"/>
+              </a:spcBef>
+              <a:spcAft>
+                <a:spcPts val="600"/>
+              </a:spcAft>
+              <a:buClr>
+                <a:schemeClr val="accent1">
+                  <a:lumMod val="75000"/>
+                </a:schemeClr>
+              </a:buClr>
+              <a:buSzPct val="145000"/>
+              <a:buFont typeface="Arial"/>
+              <a:buChar char="•"/>
+              <a:defRPr sz="1400" kern="1200" cap="none">
+                <a:solidFill>
+                  <a:schemeClr val="tx1"/>
+                </a:solidFill>
+                <a:effectLst/>
+                <a:latin typeface="+mn-lt"/>
+                <a:ea typeface="+mn-ea"/>
+                <a:cs typeface="+mn-cs"/>
+              </a:defRPr>
+            </a:lvl6pPr>
+            <a:lvl7pPr marL="2971800" indent="-228600" algn="l" defTabSz="457200" rtl="0" eaLnBrk="1" latinLnBrk="0" hangingPunct="1">
+              <a:spcBef>
+                <a:spcPct val="20000"/>
+              </a:spcBef>
+              <a:spcAft>
+                <a:spcPts val="600"/>
+              </a:spcAft>
+              <a:buClr>
+                <a:schemeClr val="accent1">
+                  <a:lumMod val="75000"/>
+                </a:schemeClr>
+              </a:buClr>
+              <a:buSzPct val="145000"/>
+              <a:buFont typeface="Arial"/>
+              <a:buChar char="•"/>
+              <a:defRPr sz="1400" kern="1200" cap="none">
+                <a:solidFill>
+                  <a:schemeClr val="tx1"/>
+                </a:solidFill>
+                <a:effectLst/>
+                <a:latin typeface="+mn-lt"/>
+                <a:ea typeface="+mn-ea"/>
+                <a:cs typeface="+mn-cs"/>
+              </a:defRPr>
+            </a:lvl7pPr>
+            <a:lvl8pPr marL="3429000" indent="-228600" algn="l" defTabSz="457200" rtl="0" eaLnBrk="1" latinLnBrk="0" hangingPunct="1">
+              <a:spcBef>
+                <a:spcPct val="20000"/>
+              </a:spcBef>
+              <a:spcAft>
+                <a:spcPts val="600"/>
+              </a:spcAft>
+              <a:buClr>
+                <a:schemeClr val="accent1">
+                  <a:lumMod val="75000"/>
+                </a:schemeClr>
+              </a:buClr>
+              <a:buSzPct val="145000"/>
+              <a:buFont typeface="Arial"/>
+              <a:buChar char="•"/>
+              <a:defRPr sz="1400" kern="1200" cap="none">
+                <a:solidFill>
+                  <a:schemeClr val="tx1"/>
+                </a:solidFill>
+                <a:effectLst/>
+                <a:latin typeface="+mn-lt"/>
+                <a:ea typeface="+mn-ea"/>
+                <a:cs typeface="+mn-cs"/>
+              </a:defRPr>
+            </a:lvl8pPr>
+            <a:lvl9pPr marL="3886200" indent="-228600" algn="l" defTabSz="457200" rtl="0" eaLnBrk="1" latinLnBrk="0" hangingPunct="1">
+              <a:spcBef>
+                <a:spcPct val="20000"/>
+              </a:spcBef>
+              <a:spcAft>
+                <a:spcPts val="600"/>
+              </a:spcAft>
+              <a:buClr>
+                <a:schemeClr val="accent1">
+                  <a:lumMod val="75000"/>
+                </a:schemeClr>
+              </a:buClr>
+              <a:buSzPct val="145000"/>
+              <a:buFont typeface="Arial"/>
+              <a:buChar char="•"/>
+              <a:defRPr sz="1400" kern="1200" cap="none">
+                <a:solidFill>
+                  <a:schemeClr val="tx1"/>
+                </a:solidFill>
+                <a:effectLst/>
+                <a:latin typeface="+mn-lt"/>
+                <a:ea typeface="+mn-ea"/>
+                <a:cs typeface="+mn-cs"/>
+              </a:defRPr>
+            </a:lvl9pPr>
+          </a:lstStyle>
+          <a:p>
+            <a:r>
+              <a:rPr lang="en-IN" dirty="0" smtClean="0"/>
+              <a:t>Sensitivity = Recall = True Positive Rate</a:t>
+            </a:r>
+          </a:p>
+          <a:p>
+            <a:r>
+              <a:rPr lang="en-US" dirty="0" smtClean="0"/>
+              <a:t>Specificity = Precision = True Negative Rate</a:t>
+            </a:r>
+          </a:p>
+          <a:p>
+            <a:r>
+              <a:rPr lang="en-US" dirty="0" smtClean="0"/>
+              <a:t>1 – Specificity = False Positive Rate = FP / (TN + FP)</a:t>
+            </a:r>
+          </a:p>
+        </p:txBody>
+      </p:sp>
+    </p:spTree>
+    <p:extLst>
+      <p:ext uri="{BB962C8B-B14F-4D97-AF65-F5344CB8AC3E}">
+        <p14:creationId xmlns:p14="http://schemas.microsoft.com/office/powerpoint/2010/main" val="617578314"/>
+      </p:ext>
+    </p:extLst>
+  </p:cSld>
+  <p:clrMapOvr>
+    <a:masterClrMapping/>
+  </p:clrMapOvr>
+  <p:timing>
+    <p:tnLst>
+      <p:par>
+        <p:cTn id="1" dur="indefinite" restart="never" nodeType="tmRoot"/>
+      </p:par>
+    </p:tnLst>
+  </p:timing>
+</p:sld>
+</file>
+
+<file path=ppt/slides/slide15.xml><?xml version="1.0" encoding="utf-8"?>
 <p:sld xmlns:a="http://schemas.openxmlformats.org/drawingml/2006/main" xmlns:r="http://schemas.openxmlformats.org/officeDocument/2006/relationships" xmlns:p="http://schemas.openxmlformats.org/presentationml/2006/main">
   <p:cSld>
     <p:spTree>

</xml_diff>